<commit_message>
Fix kernel version of lab04
modified:   lab04.pptx
</commit_message>
<xml_diff>
--- a/slides/lab04.pptx
+++ b/slides/lab04.pptx
@@ -4378,35 +4378,15 @@
                 <a:ea typeface="Courier" charset="0"/>
                 <a:cs typeface="Courier" charset="0"/>
               </a:rPr>
-              <a:t> linux-4.13.2.tar.xz</a:t>
-            </a:r>
-          </a:p>
-          <a:p>
+              <a:t> </a:t>
+            </a:r>
             <a:r>
               <a:rPr lang="en-US" sz="1600" dirty="0" smtClean="0">
                 <a:latin typeface="Courier" charset="0"/>
                 <a:ea typeface="Courier" charset="0"/>
                 <a:cs typeface="Courier" charset="0"/>
               </a:rPr>
-              <a:t>$ cd linux-4.13.2</a:t>
-            </a:r>
-          </a:p>
-          <a:p>
-            <a:r>
-              <a:rPr lang="en-US" sz="1600" dirty="0" smtClean="0">
-                <a:latin typeface="Courier" charset="0"/>
-                <a:ea typeface="Courier" charset="0"/>
-                <a:cs typeface="Courier" charset="0"/>
-              </a:rPr>
-              <a:t>$ make </a:t>
-            </a:r>
-            <a:r>
-              <a:rPr lang="en-US" sz="1600" dirty="0" err="1" smtClean="0">
-                <a:latin typeface="Courier" charset="0"/>
-                <a:ea typeface="Courier" charset="0"/>
-                <a:cs typeface="Courier" charset="0"/>
-              </a:rPr>
-              <a:t>localmodconfig</a:t>
+              <a:t>linux-4.4.1.tar.xz</a:t>
             </a:r>
             <a:endParaRPr lang="en-US" sz="1600" dirty="0" smtClean="0">
               <a:latin typeface="Courier" charset="0"/>
@@ -4421,7 +4401,7 @@
                 <a:ea typeface="Courier" charset="0"/>
                 <a:cs typeface="Courier" charset="0"/>
               </a:rPr>
-              <a:t>$ make </a:t>
+              <a:t>$ cd </a:t>
             </a:r>
             <a:r>
               <a:rPr lang="en-US" sz="1600" dirty="0" smtClean="0">
@@ -4429,7 +4409,7 @@
                 <a:ea typeface="Courier" charset="0"/>
                 <a:cs typeface="Courier" charset="0"/>
               </a:rPr>
-              <a:t>all # or make?</a:t>
+              <a:t>linux-4.4.1</a:t>
             </a:r>
             <a:endParaRPr lang="en-US" sz="1600" dirty="0" smtClean="0">
               <a:latin typeface="Courier" charset="0"/>
@@ -4439,6 +4419,63 @@
           </a:p>
           <a:p>
             <a:r>
+              <a:rPr lang="en-US" sz="1600" dirty="0" smtClean="0">
+                <a:latin typeface="Courier" charset="0"/>
+                <a:ea typeface="Courier" charset="0"/>
+                <a:cs typeface="Courier" charset="0"/>
+              </a:rPr>
+              <a:t>$ make </a:t>
+            </a:r>
+            <a:r>
+              <a:rPr lang="en-US" sz="1600" dirty="0" err="1" smtClean="0">
+                <a:latin typeface="Courier" charset="0"/>
+                <a:ea typeface="Courier" charset="0"/>
+                <a:cs typeface="Courier" charset="0"/>
+              </a:rPr>
+              <a:t>localmodconfig</a:t>
+            </a:r>
+            <a:endParaRPr lang="en-US" sz="1600" dirty="0" smtClean="0">
+              <a:latin typeface="Courier" charset="0"/>
+              <a:ea typeface="Courier" charset="0"/>
+              <a:cs typeface="Courier" charset="0"/>
+            </a:endParaRPr>
+          </a:p>
+          <a:p>
+            <a:r>
+              <a:rPr lang="en-US" sz="1600" dirty="0" smtClean="0">
+                <a:latin typeface="Courier" charset="0"/>
+                <a:ea typeface="Courier" charset="0"/>
+                <a:cs typeface="Courier" charset="0"/>
+              </a:rPr>
+              <a:t>$ make </a:t>
+            </a:r>
+            <a:r>
+              <a:rPr lang="mr-IN" sz="1600" dirty="0" smtClean="0">
+                <a:latin typeface="Courier" charset="0"/>
+                <a:ea typeface="Courier" charset="0"/>
+                <a:cs typeface="Courier" charset="0"/>
+              </a:rPr>
+              <a:t>–</a:t>
+            </a:r>
+            <a:r>
+              <a:rPr lang="en-US" sz="1600" smtClean="0">
+                <a:latin typeface="Courier" charset="0"/>
+                <a:ea typeface="Courier" charset="0"/>
+                <a:cs typeface="Courier" charset="0"/>
+              </a:rPr>
+              <a:t>j2 all </a:t>
+            </a:r>
+            <a:r>
+              <a:rPr lang="en-US" sz="1600" dirty="0" smtClean="0">
+                <a:latin typeface="Courier" charset="0"/>
+                <a:ea typeface="Courier" charset="0"/>
+                <a:cs typeface="Courier" charset="0"/>
+              </a:rPr>
+              <a:t># or make?</a:t>
+            </a:r>
+          </a:p>
+          <a:p>
+            <a:r>
               <a:rPr lang="en-US" sz="1600" dirty="0">
                 <a:latin typeface="Courier" charset="0"/>
                 <a:ea typeface="Courier" charset="0"/>
@@ -4467,33 +4504,17 @@
                 <a:ea typeface="Courier" charset="0"/>
                 <a:cs typeface="Courier" charset="0"/>
               </a:rPr>
-              <a:t>$ </a:t>
-            </a:r>
+              <a:t>$ make install</a:t>
+            </a:r>
+          </a:p>
+          <a:p>
             <a:r>
               <a:rPr lang="en-US" sz="1600" dirty="0" smtClean="0">
                 <a:latin typeface="Courier" charset="0"/>
                 <a:ea typeface="Courier" charset="0"/>
                 <a:cs typeface="Courier" charset="0"/>
               </a:rPr>
-              <a:t>make install</a:t>
-            </a:r>
-          </a:p>
-          <a:p>
-            <a:r>
-              <a:rPr lang="en-US" sz="1600" dirty="0" smtClean="0">
-                <a:latin typeface="Courier" charset="0"/>
-                <a:ea typeface="Courier" charset="0"/>
-                <a:cs typeface="Courier" charset="0"/>
-              </a:rPr>
-              <a:t>Boot </a:t>
-            </a:r>
-            <a:r>
-              <a:rPr lang="en-US" sz="1600" dirty="0" smtClean="0">
-                <a:latin typeface="Courier" charset="0"/>
-                <a:ea typeface="Courier" charset="0"/>
-                <a:cs typeface="Courier" charset="0"/>
-              </a:rPr>
-              <a:t>into the new kernel.</a:t>
+              <a:t>Boot into the new kernel.</a:t>
             </a:r>
             <a:endParaRPr lang="en-US" sz="1600" dirty="0">
               <a:latin typeface="Courier" charset="0"/>
@@ -4579,7 +4600,6 @@
               <a:rPr lang="en-US" smtClean="0"/>
               <a:t>online resources.</a:t>
             </a:r>
-            <a:endParaRPr lang="en-US" smtClean="0"/>
           </a:p>
           <a:p>
             <a:r>

</xml_diff>

<commit_message>
Update the grub command
modified:   lab04.pptx
</commit_message>
<xml_diff>
--- a/slides/lab04.pptx
+++ b/slides/lab04.pptx
@@ -202,7 +202,7 @@
           <a:p>
             <a:fld id="{0447BC92-E53A-F24D-A51D-7FB076BCC6F1}" type="datetimeFigureOut">
               <a:rPr lang="en-US" smtClean="0"/>
-              <a:t>9/19/17</a:t>
+              <a:t>9/24/17</a:t>
             </a:fld>
             <a:endParaRPr lang="en-US"/>
           </a:p>
@@ -967,7 +967,7 @@
           <a:p>
             <a:fld id="{F39D0AC7-9083-8749-AA05-79D3CDD3A717}" type="datetimeFigureOut">
               <a:rPr lang="en-US" smtClean="0"/>
-              <a:t>9/19/17</a:t>
+              <a:t>9/24/17</a:t>
             </a:fld>
             <a:endParaRPr lang="en-US"/>
           </a:p>
@@ -1132,7 +1132,7 @@
           <a:p>
             <a:fld id="{F39D0AC7-9083-8749-AA05-79D3CDD3A717}" type="datetimeFigureOut">
               <a:rPr lang="en-US" smtClean="0"/>
-              <a:t>9/19/17</a:t>
+              <a:t>9/24/17</a:t>
             </a:fld>
             <a:endParaRPr lang="en-US"/>
           </a:p>
@@ -1307,7 +1307,7 @@
           <a:p>
             <a:fld id="{F39D0AC7-9083-8749-AA05-79D3CDD3A717}" type="datetimeFigureOut">
               <a:rPr lang="en-US" smtClean="0"/>
-              <a:t>9/19/17</a:t>
+              <a:t>9/24/17</a:t>
             </a:fld>
             <a:endParaRPr lang="en-US"/>
           </a:p>
@@ -1472,7 +1472,7 @@
           <a:p>
             <a:fld id="{F39D0AC7-9083-8749-AA05-79D3CDD3A717}" type="datetimeFigureOut">
               <a:rPr lang="en-US" smtClean="0"/>
-              <a:t>9/19/17</a:t>
+              <a:t>9/24/17</a:t>
             </a:fld>
             <a:endParaRPr lang="en-US"/>
           </a:p>
@@ -1711,7 +1711,7 @@
           <a:p>
             <a:fld id="{F39D0AC7-9083-8749-AA05-79D3CDD3A717}" type="datetimeFigureOut">
               <a:rPr lang="en-US" smtClean="0"/>
-              <a:t>9/19/17</a:t>
+              <a:t>9/24/17</a:t>
             </a:fld>
             <a:endParaRPr lang="en-US"/>
           </a:p>
@@ -1938,7 +1938,7 @@
           <a:p>
             <a:fld id="{F39D0AC7-9083-8749-AA05-79D3CDD3A717}" type="datetimeFigureOut">
               <a:rPr lang="en-US" smtClean="0"/>
-              <a:t>9/19/17</a:t>
+              <a:t>9/24/17</a:t>
             </a:fld>
             <a:endParaRPr lang="en-US"/>
           </a:p>
@@ -2300,7 +2300,7 @@
           <a:p>
             <a:fld id="{F39D0AC7-9083-8749-AA05-79D3CDD3A717}" type="datetimeFigureOut">
               <a:rPr lang="en-US" smtClean="0"/>
-              <a:t>9/19/17</a:t>
+              <a:t>9/24/17</a:t>
             </a:fld>
             <a:endParaRPr lang="en-US"/>
           </a:p>
@@ -2413,7 +2413,7 @@
           <a:p>
             <a:fld id="{F39D0AC7-9083-8749-AA05-79D3CDD3A717}" type="datetimeFigureOut">
               <a:rPr lang="en-US" smtClean="0"/>
-              <a:t>9/19/17</a:t>
+              <a:t>9/24/17</a:t>
             </a:fld>
             <a:endParaRPr lang="en-US"/>
           </a:p>
@@ -2503,7 +2503,7 @@
           <a:p>
             <a:fld id="{F39D0AC7-9083-8749-AA05-79D3CDD3A717}" type="datetimeFigureOut">
               <a:rPr lang="en-US" smtClean="0"/>
-              <a:t>9/19/17</a:t>
+              <a:t>9/24/17</a:t>
             </a:fld>
             <a:endParaRPr lang="en-US"/>
           </a:p>
@@ -2775,7 +2775,7 @@
           <a:p>
             <a:fld id="{F39D0AC7-9083-8749-AA05-79D3CDD3A717}" type="datetimeFigureOut">
               <a:rPr lang="en-US" smtClean="0"/>
-              <a:t>9/19/17</a:t>
+              <a:t>9/24/17</a:t>
             </a:fld>
             <a:endParaRPr lang="en-US"/>
           </a:p>
@@ -3027,7 +3027,7 @@
           <a:p>
             <a:fld id="{F39D0AC7-9083-8749-AA05-79D3CDD3A717}" type="datetimeFigureOut">
               <a:rPr lang="en-US" smtClean="0"/>
-              <a:t>9/19/17</a:t>
+              <a:t>9/24/17</a:t>
             </a:fld>
             <a:endParaRPr lang="en-US"/>
           </a:p>
@@ -3235,7 +3235,7 @@
           <a:p>
             <a:fld id="{F39D0AC7-9083-8749-AA05-79D3CDD3A717}" type="datetimeFigureOut">
               <a:rPr lang="en-US" smtClean="0"/>
-              <a:t>9/19/17</a:t>
+              <a:t>9/24/17</a:t>
             </a:fld>
             <a:endParaRPr lang="en-US"/>
           </a:p>
@@ -3916,6 +3916,28 @@
               <a:buFont typeface="+mj-lt"/>
               <a:buAutoNum type="arabicPeriod"/>
             </a:pPr>
+            <a:r>
+              <a:rPr lang="en-US" sz="2400" dirty="0" err="1" smtClean="0">
+                <a:latin typeface="Courier" charset="0"/>
+                <a:ea typeface="Courier" charset="0"/>
+                <a:cs typeface="Courier" charset="0"/>
+              </a:rPr>
+              <a:t>sudo</a:t>
+            </a:r>
+            <a:r>
+              <a:rPr lang="en-US" sz="2400" dirty="0" smtClean="0">
+                <a:latin typeface="Courier" charset="0"/>
+                <a:ea typeface="Courier" charset="0"/>
+                <a:cs typeface="Courier" charset="0"/>
+              </a:rPr>
+              <a:t> update-grub</a:t>
+            </a:r>
+          </a:p>
+          <a:p>
+            <a:pPr marL="514350" indent="-514350">
+              <a:buFont typeface="+mj-lt"/>
+              <a:buAutoNum type="arabicPeriod"/>
+            </a:pPr>
             <a:endParaRPr lang="en-US" sz="2400" dirty="0">
               <a:latin typeface="Courier" charset="0"/>
               <a:ea typeface="Courier" charset="0"/>
@@ -4401,10 +4423,18 @@
                 <a:ea typeface="Courier" charset="0"/>
                 <a:cs typeface="Courier" charset="0"/>
               </a:rPr>
-              <a:t>$ cd </a:t>
-            </a:r>
-            <a:r>
-              <a:rPr lang="en-US" sz="1600" dirty="0" smtClean="0">
+              <a:t>$ </a:t>
+            </a:r>
+            <a:r>
+              <a:rPr lang="en-US" sz="1600" smtClean="0">
+                <a:latin typeface="Courier" charset="0"/>
+                <a:ea typeface="Courier" charset="0"/>
+                <a:cs typeface="Courier" charset="0"/>
+              </a:rPr>
+              <a:t>cd </a:t>
+            </a:r>
+            <a:r>
+              <a:rPr lang="en-US" sz="1600" smtClean="0">
                 <a:latin typeface="Courier" charset="0"/>
                 <a:ea typeface="Courier" charset="0"/>
                 <a:cs typeface="Courier" charset="0"/>
@@ -4447,31 +4477,7 @@
                 <a:ea typeface="Courier" charset="0"/>
                 <a:cs typeface="Courier" charset="0"/>
               </a:rPr>
-              <a:t>$ make </a:t>
-            </a:r>
-            <a:r>
-              <a:rPr lang="mr-IN" sz="1600" dirty="0" smtClean="0">
-                <a:latin typeface="Courier" charset="0"/>
-                <a:ea typeface="Courier" charset="0"/>
-                <a:cs typeface="Courier" charset="0"/>
-              </a:rPr>
-              <a:t>–</a:t>
-            </a:r>
-            <a:r>
-              <a:rPr lang="en-US" sz="1600" smtClean="0">
-                <a:latin typeface="Courier" charset="0"/>
-                <a:ea typeface="Courier" charset="0"/>
-                <a:cs typeface="Courier" charset="0"/>
-              </a:rPr>
-              <a:t>j2 all </a:t>
-            </a:r>
-            <a:r>
-              <a:rPr lang="en-US" sz="1600" dirty="0" smtClean="0">
-                <a:latin typeface="Courier" charset="0"/>
-                <a:ea typeface="Courier" charset="0"/>
-                <a:cs typeface="Courier" charset="0"/>
-              </a:rPr>
-              <a:t># or make?</a:t>
+              <a:t>$ make all # or make?</a:t>
             </a:r>
           </a:p>
           <a:p>

</xml_diff>